<commit_message>
css - lesson 1
</commit_message>
<xml_diff>
--- a/تصميم مواقع الانترنت.pptx
+++ b/تصميم مواقع الانترنت.pptx
@@ -9,8 +9,8 @@
     <p:sldId id="257" r:id="rId3"/>
     <p:sldId id="258" r:id="rId4"/>
     <p:sldId id="260" r:id="rId5"/>
-    <p:sldId id="259" r:id="rId6"/>
-    <p:sldId id="262" r:id="rId7"/>
+    <p:sldId id="263" r:id="rId6"/>
+    <p:sldId id="264" r:id="rId7"/>
   </p:sldIdLst>
   <p:sldSz cx="12192000" cy="6858000"/>
   <p:notesSz cx="6858000" cy="9144000"/>
@@ -303,7 +303,7 @@
           <a:p>
             <a:fld id="{838D2330-E475-4AF4-9190-D13FEC54F64A}" type="datetimeFigureOut">
               <a:rPr lang="en-GB" smtClean="0"/>
-              <a:t>17/03/2021</a:t>
+              <a:t>27/05/2021</a:t>
             </a:fld>
             <a:endParaRPr lang="en-GB"/>
           </a:p>
@@ -578,7 +578,7 @@
           <a:p>
             <a:fld id="{838D2330-E475-4AF4-9190-D13FEC54F64A}" type="datetimeFigureOut">
               <a:rPr lang="en-GB" smtClean="0"/>
-              <a:t>17/03/2021</a:t>
+              <a:t>27/05/2021</a:t>
             </a:fld>
             <a:endParaRPr lang="en-GB"/>
           </a:p>
@@ -772,7 +772,7 @@
           <a:p>
             <a:fld id="{838D2330-E475-4AF4-9190-D13FEC54F64A}" type="datetimeFigureOut">
               <a:rPr lang="en-GB" smtClean="0"/>
-              <a:t>17/03/2021</a:t>
+              <a:t>27/05/2021</a:t>
             </a:fld>
             <a:endParaRPr lang="en-GB"/>
           </a:p>
@@ -1045,7 +1045,7 @@
           <a:p>
             <a:fld id="{838D2330-E475-4AF4-9190-D13FEC54F64A}" type="datetimeFigureOut">
               <a:rPr lang="en-GB" smtClean="0"/>
-              <a:t>17/03/2021</a:t>
+              <a:t>27/05/2021</a:t>
             </a:fld>
             <a:endParaRPr lang="en-GB"/>
           </a:p>
@@ -1386,7 +1386,7 @@
           <a:p>
             <a:fld id="{838D2330-E475-4AF4-9190-D13FEC54F64A}" type="datetimeFigureOut">
               <a:rPr lang="en-GB" smtClean="0"/>
-              <a:t>17/03/2021</a:t>
+              <a:t>27/05/2021</a:t>
             </a:fld>
             <a:endParaRPr lang="en-GB"/>
           </a:p>
@@ -2009,7 +2009,7 @@
           <a:p>
             <a:fld id="{838D2330-E475-4AF4-9190-D13FEC54F64A}" type="datetimeFigureOut">
               <a:rPr lang="en-GB" smtClean="0"/>
-              <a:t>17/03/2021</a:t>
+              <a:t>27/05/2021</a:t>
             </a:fld>
             <a:endParaRPr lang="en-GB"/>
           </a:p>
@@ -2869,7 +2869,7 @@
           <a:p>
             <a:fld id="{838D2330-E475-4AF4-9190-D13FEC54F64A}" type="datetimeFigureOut">
               <a:rPr lang="en-GB" smtClean="0"/>
-              <a:t>17/03/2021</a:t>
+              <a:t>27/05/2021</a:t>
             </a:fld>
             <a:endParaRPr lang="en-GB"/>
           </a:p>
@@ -3039,7 +3039,7 @@
           <a:p>
             <a:fld id="{838D2330-E475-4AF4-9190-D13FEC54F64A}" type="datetimeFigureOut">
               <a:rPr lang="en-GB" smtClean="0"/>
-              <a:t>17/03/2021</a:t>
+              <a:t>27/05/2021</a:t>
             </a:fld>
             <a:endParaRPr lang="en-GB"/>
           </a:p>
@@ -3219,7 +3219,7 @@
           <a:p>
             <a:fld id="{838D2330-E475-4AF4-9190-D13FEC54F64A}" type="datetimeFigureOut">
               <a:rPr lang="en-GB" smtClean="0"/>
-              <a:t>17/03/2021</a:t>
+              <a:t>27/05/2021</a:t>
             </a:fld>
             <a:endParaRPr lang="en-GB"/>
           </a:p>
@@ -3389,7 +3389,7 @@
           <a:p>
             <a:fld id="{838D2330-E475-4AF4-9190-D13FEC54F64A}" type="datetimeFigureOut">
               <a:rPr lang="en-GB" smtClean="0"/>
-              <a:t>17/03/2021</a:t>
+              <a:t>27/05/2021</a:t>
             </a:fld>
             <a:endParaRPr lang="en-GB"/>
           </a:p>
@@ -3636,7 +3636,7 @@
           <a:p>
             <a:fld id="{838D2330-E475-4AF4-9190-D13FEC54F64A}" type="datetimeFigureOut">
               <a:rPr lang="en-GB" smtClean="0"/>
-              <a:t>17/03/2021</a:t>
+              <a:t>27/05/2021</a:t>
             </a:fld>
             <a:endParaRPr lang="en-GB"/>
           </a:p>
@@ -3928,7 +3928,7 @@
           <a:p>
             <a:fld id="{838D2330-E475-4AF4-9190-D13FEC54F64A}" type="datetimeFigureOut">
               <a:rPr lang="en-GB" smtClean="0"/>
-              <a:t>17/03/2021</a:t>
+              <a:t>27/05/2021</a:t>
             </a:fld>
             <a:endParaRPr lang="en-GB"/>
           </a:p>
@@ -4372,7 +4372,7 @@
           <a:p>
             <a:fld id="{838D2330-E475-4AF4-9190-D13FEC54F64A}" type="datetimeFigureOut">
               <a:rPr lang="en-GB" smtClean="0"/>
-              <a:t>17/03/2021</a:t>
+              <a:t>27/05/2021</a:t>
             </a:fld>
             <a:endParaRPr lang="en-GB"/>
           </a:p>
@@ -4490,7 +4490,7 @@
           <a:p>
             <a:fld id="{838D2330-E475-4AF4-9190-D13FEC54F64A}" type="datetimeFigureOut">
               <a:rPr lang="en-GB" smtClean="0"/>
-              <a:t>17/03/2021</a:t>
+              <a:t>27/05/2021</a:t>
             </a:fld>
             <a:endParaRPr lang="en-GB"/>
           </a:p>
@@ -4585,7 +4585,7 @@
           <a:p>
             <a:fld id="{838D2330-E475-4AF4-9190-D13FEC54F64A}" type="datetimeFigureOut">
               <a:rPr lang="en-GB" smtClean="0"/>
-              <a:t>17/03/2021</a:t>
+              <a:t>27/05/2021</a:t>
             </a:fld>
             <a:endParaRPr lang="en-GB"/>
           </a:p>
@@ -4864,7 +4864,7 @@
           <a:p>
             <a:fld id="{838D2330-E475-4AF4-9190-D13FEC54F64A}" type="datetimeFigureOut">
               <a:rPr lang="en-GB" smtClean="0"/>
-              <a:t>17/03/2021</a:t>
+              <a:t>27/05/2021</a:t>
             </a:fld>
             <a:endParaRPr lang="en-GB"/>
           </a:p>
@@ -5139,7 +5139,7 @@
           <a:p>
             <a:fld id="{838D2330-E475-4AF4-9190-D13FEC54F64A}" type="datetimeFigureOut">
               <a:rPr lang="en-GB" smtClean="0"/>
-              <a:t>17/03/2021</a:t>
+              <a:t>27/05/2021</a:t>
             </a:fld>
             <a:endParaRPr lang="en-GB"/>
           </a:p>
@@ -5568,7 +5568,7 @@
           <a:p>
             <a:fld id="{838D2330-E475-4AF4-9190-D13FEC54F64A}" type="datetimeFigureOut">
               <a:rPr lang="en-GB" smtClean="0"/>
-              <a:t>17/03/2021</a:t>
+              <a:t>27/05/2021</a:t>
             </a:fld>
             <a:endParaRPr lang="en-GB"/>
           </a:p>
@@ -6929,99 +6929,141 @@
       </p:grpSpPr>
       <p:sp>
         <p:nvSpPr>
-          <p:cNvPr id="4" name="Rectangle 3">
+          <p:cNvPr id="2" name="Title 1">
             <a:extLst>
               <a:ext uri="{FF2B5EF4-FFF2-40B4-BE49-F238E27FC236}">
-                <a16:creationId xmlns:a16="http://schemas.microsoft.com/office/drawing/2014/main" id="{499588CE-3937-4A18-B419-995A67305B15}"/>
+                <a16:creationId xmlns:a16="http://schemas.microsoft.com/office/drawing/2014/main" id="{CA3DF656-8E2F-4D89-956A-1C69B77DFBEA}"/>
               </a:ext>
             </a:extLst>
           </p:cNvPr>
-          <p:cNvSpPr/>
-          <p:nvPr/>
+          <p:cNvSpPr>
+            <a:spLocks noGrp="1"/>
+          </p:cNvSpPr>
+          <p:nvPr>
+            <p:ph type="title"/>
+          </p:nvPr>
         </p:nvSpPr>
         <p:spPr>
           <a:xfrm>
-            <a:off x="3261360" y="1920240"/>
-            <a:ext cx="5364480" cy="2844800"/>
+            <a:off x="645130" y="452718"/>
+            <a:ext cx="9404723" cy="1400530"/>
           </a:xfrm>
-          <a:prstGeom prst="rect">
-            <a:avLst/>
-          </a:prstGeom>
-          <a:noFill/>
-          <a:ln w="57150">
-            <a:solidFill>
-              <a:schemeClr val="tx1"/>
-            </a:solidFill>
-          </a:ln>
         </p:spPr>
-        <p:style>
-          <a:lnRef idx="2">
-            <a:schemeClr val="accent6"/>
-          </a:lnRef>
-          <a:fillRef idx="1">
-            <a:schemeClr val="lt1"/>
-          </a:fillRef>
-          <a:effectRef idx="0">
-            <a:schemeClr val="accent6"/>
-          </a:effectRef>
-          <a:fontRef idx="minor">
-            <a:schemeClr val="dk1"/>
-          </a:fontRef>
-        </p:style>
-        <p:txBody>
-          <a:bodyPr rtlCol="0" anchor="ctr"/>
+        <p:txBody>
+          <a:bodyPr/>
           <a:lstStyle/>
           <a:p>
-            <a:pPr algn="ctr"/>
-            <a:endParaRPr lang="en-GB"/>
-          </a:p>
-        </p:txBody>
-      </p:sp>
-      <p:cxnSp>
-        <p:nvCxnSpPr>
-          <p:cNvPr id="7" name="Straight Connector 6">
+            <a:r>
+              <a:rPr lang="en-GB" dirty="0"/>
+              <a:t>CSS</a:t>
+            </a:r>
+            <a:br>
+              <a:rPr lang="en-GB" dirty="0"/>
+            </a:br>
+            <a:r>
+              <a:rPr lang="en-GB" dirty="0"/>
+              <a:t>Inline styling – </a:t>
+            </a:r>
+            <a:r>
+              <a:rPr lang="ar-EG" dirty="0"/>
+              <a:t>في نفس السطر</a:t>
+            </a:r>
+            <a:endParaRPr lang="en-GB" dirty="0"/>
+          </a:p>
+        </p:txBody>
+      </p:sp>
+      <p:sp>
+        <p:nvSpPr>
+          <p:cNvPr id="3" name="Content Placeholder 2">
             <a:extLst>
               <a:ext uri="{FF2B5EF4-FFF2-40B4-BE49-F238E27FC236}">
-                <a16:creationId xmlns:a16="http://schemas.microsoft.com/office/drawing/2014/main" id="{F99D6B00-8B96-482E-995D-725F272C4C6A}"/>
+                <a16:creationId xmlns:a16="http://schemas.microsoft.com/office/drawing/2014/main" id="{EC0F150F-1F7F-4812-8B4C-D886BEFFE7DD}"/>
               </a:ext>
             </a:extLst>
           </p:cNvPr>
-          <p:cNvCxnSpPr/>
-          <p:nvPr/>
-        </p:nvCxnSpPr>
-        <p:spPr>
-          <a:xfrm>
-            <a:off x="3261360" y="1930400"/>
-            <a:ext cx="5364480" cy="0"/>
-          </a:xfrm>
-          <a:prstGeom prst="line">
-            <a:avLst/>
-          </a:prstGeom>
-          <a:ln w="57150">
-            <a:solidFill>
-              <a:schemeClr val="tx1"/>
-            </a:solidFill>
-          </a:ln>
-        </p:spPr>
-        <p:style>
-          <a:lnRef idx="1">
-            <a:schemeClr val="accent1"/>
-          </a:lnRef>
-          <a:fillRef idx="0">
-            <a:schemeClr val="accent1"/>
-          </a:fillRef>
-          <a:effectRef idx="0">
-            <a:schemeClr val="accent1"/>
-          </a:effectRef>
-          <a:fontRef idx="minor">
-            <a:schemeClr val="tx1"/>
-          </a:fontRef>
-        </p:style>
-      </p:cxnSp>
+          <p:cNvSpPr>
+            <a:spLocks noGrp="1"/>
+          </p:cNvSpPr>
+          <p:nvPr>
+            <p:ph idx="1"/>
+          </p:nvPr>
+        </p:nvSpPr>
+        <p:spPr/>
+        <p:txBody>
+          <a:bodyPr/>
+          <a:lstStyle/>
+          <a:p>
+            <a:pPr algn="r" rtl="1"/>
+            <a:r>
+              <a:rPr lang="ar-EG" dirty="0"/>
+              <a:t>يكون في شكل خاصية للعنصر</a:t>
+            </a:r>
+          </a:p>
+          <a:p>
+            <a:pPr marL="0" indent="0" algn="ctr" rtl="1">
+              <a:buNone/>
+            </a:pPr>
+            <a:r>
+              <a:rPr lang="en-GB" dirty="0"/>
+              <a:t>&lt;tr style="</a:t>
+            </a:r>
+            <a:r>
+              <a:rPr lang="en-GB" dirty="0" err="1"/>
+              <a:t>color</a:t>
+            </a:r>
+            <a:r>
+              <a:rPr lang="en-GB" dirty="0"/>
+              <a:t>: white; background: </a:t>
+            </a:r>
+            <a:r>
+              <a:rPr lang="en-GB" dirty="0" err="1"/>
+              <a:t>gray</a:t>
+            </a:r>
+            <a:r>
+              <a:rPr lang="en-GB" dirty="0"/>
+              <a:t>"&gt;</a:t>
+            </a:r>
+          </a:p>
+          <a:p>
+            <a:pPr algn="r" rtl="1"/>
+            <a:r>
+              <a:rPr lang="ar-EG" dirty="0"/>
+              <a:t>عيوب هذه الطريقة:</a:t>
+            </a:r>
+          </a:p>
+          <a:p>
+            <a:pPr lvl="1" algn="r" rtl="1"/>
+            <a:r>
+              <a:rPr lang="ar-EG" dirty="0"/>
+              <a:t>مضيعة للوقت</a:t>
+            </a:r>
+          </a:p>
+          <a:p>
+            <a:pPr lvl="1" algn="r" rtl="1"/>
+            <a:r>
+              <a:rPr lang="ar-EG" dirty="0"/>
+              <a:t>صعبة الصيانة</a:t>
+            </a:r>
+            <a:endParaRPr lang="en-GB" dirty="0"/>
+          </a:p>
+          <a:p>
+            <a:pPr marL="0" indent="0">
+              <a:buNone/>
+            </a:pPr>
+            <a:endParaRPr lang="en-GB" dirty="0"/>
+          </a:p>
+          <a:p>
+            <a:pPr marL="0" indent="0">
+              <a:buNone/>
+            </a:pPr>
+            <a:endParaRPr lang="en-GB" dirty="0"/>
+          </a:p>
+        </p:txBody>
+      </p:sp>
     </p:spTree>
     <p:extLst>
       <p:ext uri="{BB962C8B-B14F-4D97-AF65-F5344CB8AC3E}">
-        <p14:creationId xmlns:p14="http://schemas.microsoft.com/office/powerpoint/2010/main" val="403934125"/>
+        <p14:creationId xmlns:p14="http://schemas.microsoft.com/office/powerpoint/2010/main" val="3749930179"/>
       </p:ext>
     </p:extLst>
   </p:cSld>
@@ -7048,578 +7090,357 @@
           <a:chExt cx="0" cy="0"/>
         </a:xfrm>
       </p:grpSpPr>
-      <p:cxnSp>
-        <p:nvCxnSpPr>
-          <p:cNvPr id="4" name="Straight Connector 3">
+      <p:sp>
+        <p:nvSpPr>
+          <p:cNvPr id="2" name="Title 1">
             <a:extLst>
               <a:ext uri="{FF2B5EF4-FFF2-40B4-BE49-F238E27FC236}">
-                <a16:creationId xmlns:a16="http://schemas.microsoft.com/office/drawing/2014/main" id="{600F97CF-D0BB-4922-A1EB-710FD24979A4}"/>
+                <a16:creationId xmlns:a16="http://schemas.microsoft.com/office/drawing/2014/main" id="{5B318C64-4491-4FC4-88F8-86D32C356FB9}"/>
               </a:ext>
             </a:extLst>
           </p:cNvPr>
-          <p:cNvCxnSpPr/>
-          <p:nvPr/>
-        </p:nvCxnSpPr>
-        <p:spPr>
-          <a:xfrm>
-            <a:off x="3261360" y="1930400"/>
-            <a:ext cx="5364480" cy="0"/>
-          </a:xfrm>
-          <a:prstGeom prst="line">
-            <a:avLst/>
-          </a:prstGeom>
-          <a:ln w="57150">
-            <a:solidFill>
-              <a:schemeClr val="tx1"/>
-            </a:solidFill>
-          </a:ln>
-        </p:spPr>
-        <p:style>
-          <a:lnRef idx="1">
-            <a:schemeClr val="accent1"/>
-          </a:lnRef>
-          <a:fillRef idx="0">
-            <a:schemeClr val="accent1"/>
-          </a:fillRef>
-          <a:effectRef idx="0">
-            <a:schemeClr val="accent1"/>
-          </a:effectRef>
-          <a:fontRef idx="minor">
-            <a:schemeClr val="tx1"/>
-          </a:fontRef>
-        </p:style>
-      </p:cxnSp>
-      <p:cxnSp>
-        <p:nvCxnSpPr>
-          <p:cNvPr id="6" name="Straight Connector 5">
+          <p:cNvSpPr>
+            <a:spLocks noGrp="1"/>
+          </p:cNvSpPr>
+          <p:nvPr>
+            <p:ph type="title"/>
+          </p:nvPr>
+        </p:nvSpPr>
+        <p:spPr/>
+        <p:txBody>
+          <a:bodyPr/>
+          <a:lstStyle/>
+          <a:p>
+            <a:r>
+              <a:rPr lang="en-GB" dirty="0"/>
+              <a:t>CSS</a:t>
+            </a:r>
+            <a:br>
+              <a:rPr lang="en-GB" dirty="0"/>
+            </a:br>
+            <a:r>
+              <a:rPr lang="en-GB" dirty="0"/>
+              <a:t>style tag – </a:t>
+            </a:r>
+            <a:r>
+              <a:rPr lang="ar-EG" dirty="0"/>
+              <a:t>عنصر الستايل</a:t>
+            </a:r>
+            <a:endParaRPr lang="en-GB" dirty="0"/>
+          </a:p>
+        </p:txBody>
+      </p:sp>
+      <p:sp>
+        <p:nvSpPr>
+          <p:cNvPr id="3" name="Content Placeholder 2">
             <a:extLst>
               <a:ext uri="{FF2B5EF4-FFF2-40B4-BE49-F238E27FC236}">
-                <a16:creationId xmlns:a16="http://schemas.microsoft.com/office/drawing/2014/main" id="{A4D87F9A-27F6-4AE9-8898-786B9276041C}"/>
+                <a16:creationId xmlns:a16="http://schemas.microsoft.com/office/drawing/2014/main" id="{59001008-41E2-4377-BDFB-D70098167CB4}"/>
               </a:ext>
             </a:extLst>
           </p:cNvPr>
-          <p:cNvCxnSpPr>
-            <a:cxnSpLocks/>
-          </p:cNvCxnSpPr>
-          <p:nvPr/>
-        </p:nvCxnSpPr>
+          <p:cNvSpPr>
+            <a:spLocks noGrp="1"/>
+          </p:cNvSpPr>
+          <p:nvPr>
+            <p:ph idx="1"/>
+          </p:nvPr>
+        </p:nvSpPr>
         <p:spPr>
           <a:xfrm>
-            <a:off x="3261360" y="1930400"/>
-            <a:ext cx="0" cy="2834640"/>
+            <a:off x="1103312" y="2052918"/>
+            <a:ext cx="8946541" cy="4678808"/>
           </a:xfrm>
-          <a:prstGeom prst="line">
-            <a:avLst/>
-          </a:prstGeom>
-          <a:ln w="57150">
-            <a:solidFill>
-              <a:schemeClr val="tx1"/>
-            </a:solidFill>
-          </a:ln>
         </p:spPr>
-        <p:style>
-          <a:lnRef idx="1">
-            <a:schemeClr val="accent1"/>
-          </a:lnRef>
-          <a:fillRef idx="0">
-            <a:schemeClr val="accent1"/>
-          </a:fillRef>
-          <a:effectRef idx="0">
-            <a:schemeClr val="accent1"/>
-          </a:effectRef>
-          <a:fontRef idx="minor">
-            <a:schemeClr val="tx1"/>
-          </a:fontRef>
-        </p:style>
-      </p:cxnSp>
-      <p:cxnSp>
-        <p:nvCxnSpPr>
-          <p:cNvPr id="7" name="Straight Connector 6">
-            <a:extLst>
-              <a:ext uri="{FF2B5EF4-FFF2-40B4-BE49-F238E27FC236}">
-                <a16:creationId xmlns:a16="http://schemas.microsoft.com/office/drawing/2014/main" id="{EBD992AF-1CA7-4CB7-85E2-AA4366CEAD2D}"/>
-              </a:ext>
-            </a:extLst>
-          </p:cNvPr>
-          <p:cNvCxnSpPr>
-            <a:cxnSpLocks/>
-          </p:cNvCxnSpPr>
-          <p:nvPr/>
-        </p:nvCxnSpPr>
-        <p:spPr>
-          <a:xfrm>
-            <a:off x="8625840" y="1930400"/>
-            <a:ext cx="0" cy="2834640"/>
-          </a:xfrm>
-          <a:prstGeom prst="line">
-            <a:avLst/>
-          </a:prstGeom>
-          <a:ln w="57150">
-            <a:solidFill>
-              <a:schemeClr val="tx1"/>
-            </a:solidFill>
-          </a:ln>
-        </p:spPr>
-        <p:style>
-          <a:lnRef idx="1">
-            <a:schemeClr val="accent1"/>
-          </a:lnRef>
-          <a:fillRef idx="0">
-            <a:schemeClr val="accent1"/>
-          </a:fillRef>
-          <a:effectRef idx="0">
-            <a:schemeClr val="accent1"/>
-          </a:effectRef>
-          <a:fontRef idx="minor">
-            <a:schemeClr val="tx1"/>
-          </a:fontRef>
-        </p:style>
-      </p:cxnSp>
-      <p:cxnSp>
-        <p:nvCxnSpPr>
-          <p:cNvPr id="8" name="Straight Connector 7">
-            <a:extLst>
-              <a:ext uri="{FF2B5EF4-FFF2-40B4-BE49-F238E27FC236}">
-                <a16:creationId xmlns:a16="http://schemas.microsoft.com/office/drawing/2014/main" id="{1F92869C-8583-45C8-9A3C-7D2A20539481}"/>
-              </a:ext>
-            </a:extLst>
-          </p:cNvPr>
-          <p:cNvCxnSpPr/>
-          <p:nvPr/>
-        </p:nvCxnSpPr>
-        <p:spPr>
-          <a:xfrm>
-            <a:off x="3261360" y="4765040"/>
-            <a:ext cx="5364480" cy="0"/>
-          </a:xfrm>
-          <a:prstGeom prst="line">
-            <a:avLst/>
-          </a:prstGeom>
-          <a:ln w="57150">
-            <a:solidFill>
-              <a:schemeClr val="tx1"/>
-            </a:solidFill>
-          </a:ln>
-        </p:spPr>
-        <p:style>
-          <a:lnRef idx="1">
-            <a:schemeClr val="accent1"/>
-          </a:lnRef>
-          <a:fillRef idx="0">
-            <a:schemeClr val="accent1"/>
-          </a:fillRef>
-          <a:effectRef idx="0">
-            <a:schemeClr val="accent1"/>
-          </a:effectRef>
-          <a:fontRef idx="minor">
-            <a:schemeClr val="tx1"/>
-          </a:fontRef>
-        </p:style>
-      </p:cxnSp>
+        <p:txBody>
+          <a:bodyPr>
+            <a:normAutofit fontScale="77500" lnSpcReduction="20000"/>
+          </a:bodyPr>
+          <a:lstStyle/>
+          <a:p>
+            <a:pPr marL="457200" indent="-457200" algn="r" rtl="1">
+              <a:buFont typeface="+mj-lt"/>
+              <a:buAutoNum type="arabicPeriod"/>
+            </a:pPr>
+            <a:r>
+              <a:rPr lang="ar-EG" dirty="0"/>
+              <a:t>نكتب عنصر ستايل </a:t>
+            </a:r>
+            <a:r>
+              <a:rPr lang="en-GB" dirty="0"/>
+              <a:t>(style tag)</a:t>
+            </a:r>
+            <a:r>
+              <a:rPr lang="ar-EG" dirty="0"/>
+              <a:t> في رأس الـ</a:t>
+            </a:r>
+            <a:r>
+              <a:rPr lang="en-GB" dirty="0"/>
+              <a:t>HTML </a:t>
+            </a:r>
+            <a:r>
+              <a:rPr lang="ar-EG" dirty="0"/>
+              <a:t> </a:t>
+            </a:r>
+            <a:r>
+              <a:rPr lang="en-GB" dirty="0"/>
+              <a:t>-</a:t>
+            </a:r>
+            <a:r>
+              <a:rPr lang="ar-EG" dirty="0"/>
+              <a:t> أي في</a:t>
+            </a:r>
+            <a:r>
+              <a:rPr lang="en-GB" dirty="0"/>
+              <a:t> </a:t>
+            </a:r>
+            <a:r>
+              <a:rPr lang="ar-EG" dirty="0"/>
+              <a:t>الـ </a:t>
+            </a:r>
+            <a:r>
+              <a:rPr lang="en-GB" dirty="0"/>
+              <a:t>&lt;head&gt;&lt;/head&gt;</a:t>
+            </a:r>
+          </a:p>
+          <a:p>
+            <a:pPr marL="3543300" lvl="8" indent="0">
+              <a:buNone/>
+            </a:pPr>
+            <a:r>
+              <a:rPr lang="en-GB" dirty="0"/>
+              <a:t>&lt;style&gt;</a:t>
+            </a:r>
+          </a:p>
+          <a:p>
+            <a:pPr marL="3543300" lvl="8" indent="0">
+              <a:buNone/>
+            </a:pPr>
+            <a:r>
+              <a:rPr lang="en-GB" dirty="0"/>
+              <a:t>         tr {</a:t>
+            </a:r>
+          </a:p>
+          <a:p>
+            <a:pPr marL="3543300" lvl="8" indent="0">
+              <a:buNone/>
+            </a:pPr>
+            <a:r>
+              <a:rPr lang="en-GB" dirty="0"/>
+              <a:t>            </a:t>
+            </a:r>
+            <a:r>
+              <a:rPr lang="en-GB" dirty="0" err="1"/>
+              <a:t>color</a:t>
+            </a:r>
+            <a:r>
+              <a:rPr lang="en-GB" dirty="0"/>
+              <a:t>: white;</a:t>
+            </a:r>
+          </a:p>
+          <a:p>
+            <a:pPr marL="3543300" lvl="8" indent="0">
+              <a:buNone/>
+            </a:pPr>
+            <a:r>
+              <a:rPr lang="en-GB" dirty="0"/>
+              <a:t>            background-</a:t>
+            </a:r>
+            <a:r>
+              <a:rPr lang="en-GB" dirty="0" err="1"/>
+              <a:t>color</a:t>
+            </a:r>
+            <a:r>
+              <a:rPr lang="en-GB" dirty="0"/>
+              <a:t>: </a:t>
+            </a:r>
+            <a:r>
+              <a:rPr lang="en-GB" dirty="0" err="1"/>
+              <a:t>gray</a:t>
+            </a:r>
+            <a:r>
+              <a:rPr lang="en-GB" dirty="0"/>
+              <a:t>;</a:t>
+            </a:r>
+          </a:p>
+          <a:p>
+            <a:pPr marL="3543300" lvl="8" indent="0">
+              <a:buNone/>
+            </a:pPr>
+            <a:r>
+              <a:rPr lang="en-GB" dirty="0"/>
+              <a:t>         }</a:t>
+            </a:r>
+          </a:p>
+          <a:p>
+            <a:pPr marL="3543300" lvl="8" indent="0">
+              <a:buNone/>
+            </a:pPr>
+            <a:r>
+              <a:rPr lang="en-GB" dirty="0"/>
+              <a:t> &lt;/style&gt;</a:t>
+            </a:r>
+          </a:p>
+          <a:p>
+            <a:pPr marL="400050" indent="-457200" algn="r" rtl="1">
+              <a:buFont typeface="+mj-lt"/>
+              <a:buAutoNum type="arabicPeriod"/>
+            </a:pPr>
+            <a:r>
+              <a:rPr lang="ar-EG" dirty="0"/>
+              <a:t>نكتب نقطة ثم نتبعها باسم الـ</a:t>
+            </a:r>
+            <a:r>
+              <a:rPr lang="en-GB" dirty="0"/>
+              <a:t>class</a:t>
+            </a:r>
+            <a:r>
+              <a:rPr lang="ar-EG" dirty="0"/>
+              <a:t> </a:t>
+            </a:r>
+            <a:endParaRPr lang="en-GB" dirty="0"/>
+          </a:p>
+          <a:p>
+            <a:pPr marL="3543300" lvl="8" indent="0">
+              <a:buNone/>
+            </a:pPr>
+            <a:r>
+              <a:rPr lang="en-GB" dirty="0"/>
+              <a:t>&lt;style&gt;</a:t>
+            </a:r>
+          </a:p>
+          <a:p>
+            <a:pPr marL="3543300" lvl="8" indent="0">
+              <a:buNone/>
+            </a:pPr>
+            <a:r>
+              <a:rPr lang="en-GB" dirty="0"/>
+              <a:t>         .even {</a:t>
+            </a:r>
+          </a:p>
+          <a:p>
+            <a:pPr marL="3543300" lvl="8" indent="0">
+              <a:buNone/>
+            </a:pPr>
+            <a:r>
+              <a:rPr lang="en-GB" dirty="0"/>
+              <a:t>            </a:t>
+            </a:r>
+            <a:r>
+              <a:rPr lang="en-GB" dirty="0" err="1"/>
+              <a:t>color</a:t>
+            </a:r>
+            <a:r>
+              <a:rPr lang="en-GB" dirty="0"/>
+              <a:t>: white;</a:t>
+            </a:r>
+          </a:p>
+          <a:p>
+            <a:pPr marL="3543300" lvl="8" indent="0">
+              <a:buNone/>
+            </a:pPr>
+            <a:r>
+              <a:rPr lang="en-GB" dirty="0"/>
+              <a:t>            background-</a:t>
+            </a:r>
+            <a:r>
+              <a:rPr lang="en-GB" dirty="0" err="1"/>
+              <a:t>color</a:t>
+            </a:r>
+            <a:r>
+              <a:rPr lang="en-GB" dirty="0"/>
+              <a:t>: </a:t>
+            </a:r>
+            <a:r>
+              <a:rPr lang="en-GB" dirty="0" err="1"/>
+              <a:t>gray</a:t>
+            </a:r>
+            <a:r>
+              <a:rPr lang="en-GB" dirty="0"/>
+              <a:t>;</a:t>
+            </a:r>
+          </a:p>
+          <a:p>
+            <a:pPr marL="3543300" lvl="8" indent="0">
+              <a:buNone/>
+            </a:pPr>
+            <a:r>
+              <a:rPr lang="en-GB" dirty="0"/>
+              <a:t>         }</a:t>
+            </a:r>
+          </a:p>
+          <a:p>
+            <a:pPr marL="3543300" lvl="8" indent="0">
+              <a:buNone/>
+            </a:pPr>
+            <a:r>
+              <a:rPr lang="en-GB" dirty="0"/>
+              <a:t>&lt;/style&gt;</a:t>
+            </a:r>
+          </a:p>
+          <a:p>
+            <a:pPr marL="3543300" lvl="8" indent="0">
+              <a:buNone/>
+            </a:pPr>
+            <a:r>
+              <a:rPr lang="en-GB" dirty="0"/>
+              <a:t>&lt;body&gt;</a:t>
+            </a:r>
+          </a:p>
+          <a:p>
+            <a:pPr marL="3543300" lvl="8" indent="0">
+              <a:buNone/>
+            </a:pPr>
+            <a:r>
+              <a:rPr lang="en-GB" dirty="0"/>
+              <a:t>		&lt;tr class=“even”&gt; </a:t>
+            </a:r>
+            <a:r>
+              <a:rPr lang="ar-EG" dirty="0"/>
+              <a:t>حمادة </a:t>
+            </a:r>
+            <a:r>
+              <a:rPr lang="en-GB" dirty="0"/>
+              <a:t> &lt;/tr&gt;</a:t>
+            </a:r>
+          </a:p>
+          <a:p>
+            <a:pPr marL="3543300" lvl="8" indent="0">
+              <a:buNone/>
+            </a:pPr>
+            <a:r>
+              <a:rPr lang="en-GB" dirty="0"/>
+              <a:t>&lt;/body&gt;</a:t>
+            </a:r>
+          </a:p>
+          <a:p>
+            <a:pPr marL="3543300" lvl="8" indent="0">
+              <a:buNone/>
+            </a:pPr>
+            <a:endParaRPr lang="en-GB" dirty="0"/>
+          </a:p>
+          <a:p>
+            <a:pPr marL="0" indent="0" algn="r" rtl="1">
+              <a:buNone/>
+            </a:pPr>
+            <a:endParaRPr lang="en-GB" dirty="0"/>
+          </a:p>
+          <a:p>
+            <a:pPr algn="r" rtl="1"/>
+            <a:endParaRPr lang="en-GB" dirty="0"/>
+          </a:p>
+        </p:txBody>
+      </p:sp>
     </p:spTree>
     <p:extLst>
       <p:ext uri="{BB962C8B-B14F-4D97-AF65-F5344CB8AC3E}">
-        <p14:creationId xmlns:p14="http://schemas.microsoft.com/office/powerpoint/2010/main" val="428160335"/>
+        <p14:creationId xmlns:p14="http://schemas.microsoft.com/office/powerpoint/2010/main" val="3122547840"/>
       </p:ext>
     </p:extLst>
   </p:cSld>
   <p:clrMapOvr>
     <a:masterClrMapping/>
   </p:clrMapOvr>
-  <p:timing>
-    <p:tnLst>
-      <p:par>
-        <p:cTn id="1" dur="indefinite" restart="never" nodeType="tmRoot">
-          <p:childTnLst>
-            <p:seq concurrent="1" nextAc="seek">
-              <p:cTn id="2" dur="indefinite" nodeType="mainSeq">
-                <p:childTnLst>
-                  <p:par>
-                    <p:cTn id="3" fill="hold">
-                      <p:stCondLst>
-                        <p:cond delay="indefinite"/>
-                      </p:stCondLst>
-                      <p:childTnLst>
-                        <p:par>
-                          <p:cTn id="4" fill="hold">
-                            <p:stCondLst>
-                              <p:cond delay="0"/>
-                            </p:stCondLst>
-                            <p:childTnLst>
-                              <p:par>
-                                <p:cTn id="5" presetID="2" presetClass="entr" presetSubtype="4" fill="hold" nodeType="clickEffect">
-                                  <p:stCondLst>
-                                    <p:cond delay="0"/>
-                                  </p:stCondLst>
-                                  <p:childTnLst>
-                                    <p:set>
-                                      <p:cBhvr>
-                                        <p:cTn id="6" dur="1" fill="hold">
-                                          <p:stCondLst>
-                                            <p:cond delay="0"/>
-                                          </p:stCondLst>
-                                        </p:cTn>
-                                        <p:tgtEl>
-                                          <p:spTgt spid="4"/>
-                                        </p:tgtEl>
-                                        <p:attrNameLst>
-                                          <p:attrName>style.visibility</p:attrName>
-                                        </p:attrNameLst>
-                                      </p:cBhvr>
-                                      <p:to>
-                                        <p:strVal val="visible"/>
-                                      </p:to>
-                                    </p:set>
-                                    <p:anim calcmode="lin" valueType="num">
-                                      <p:cBhvr additive="base">
-                                        <p:cTn id="7" dur="500" fill="hold"/>
-                                        <p:tgtEl>
-                                          <p:spTgt spid="4"/>
-                                        </p:tgtEl>
-                                        <p:attrNameLst>
-                                          <p:attrName>ppt_x</p:attrName>
-                                        </p:attrNameLst>
-                                      </p:cBhvr>
-                                      <p:tavLst>
-                                        <p:tav tm="0">
-                                          <p:val>
-                                            <p:strVal val="#ppt_x"/>
-                                          </p:val>
-                                        </p:tav>
-                                        <p:tav tm="100000">
-                                          <p:val>
-                                            <p:strVal val="#ppt_x"/>
-                                          </p:val>
-                                        </p:tav>
-                                      </p:tavLst>
-                                    </p:anim>
-                                    <p:anim calcmode="lin" valueType="num">
-                                      <p:cBhvr additive="base">
-                                        <p:cTn id="8" dur="500" fill="hold"/>
-                                        <p:tgtEl>
-                                          <p:spTgt spid="4"/>
-                                        </p:tgtEl>
-                                        <p:attrNameLst>
-                                          <p:attrName>ppt_y</p:attrName>
-                                        </p:attrNameLst>
-                                      </p:cBhvr>
-                                      <p:tavLst>
-                                        <p:tav tm="0">
-                                          <p:val>
-                                            <p:strVal val="1+#ppt_h/2"/>
-                                          </p:val>
-                                        </p:tav>
-                                        <p:tav tm="100000">
-                                          <p:val>
-                                            <p:strVal val="#ppt_y"/>
-                                          </p:val>
-                                        </p:tav>
-                                      </p:tavLst>
-                                    </p:anim>
-                                  </p:childTnLst>
-                                </p:cTn>
-                              </p:par>
-                            </p:childTnLst>
-                          </p:cTn>
-                        </p:par>
-                      </p:childTnLst>
-                    </p:cTn>
-                  </p:par>
-                  <p:par>
-                    <p:cTn id="9" fill="hold">
-                      <p:stCondLst>
-                        <p:cond delay="indefinite"/>
-                      </p:stCondLst>
-                      <p:childTnLst>
-                        <p:par>
-                          <p:cTn id="10" fill="hold">
-                            <p:stCondLst>
-                              <p:cond delay="0"/>
-                            </p:stCondLst>
-                            <p:childTnLst>
-                              <p:par>
-                                <p:cTn id="11" presetID="2" presetClass="entr" presetSubtype="4" fill="hold" nodeType="clickEffect">
-                                  <p:stCondLst>
-                                    <p:cond delay="0"/>
-                                  </p:stCondLst>
-                                  <p:childTnLst>
-                                    <p:set>
-                                      <p:cBhvr>
-                                        <p:cTn id="12" dur="1" fill="hold">
-                                          <p:stCondLst>
-                                            <p:cond delay="0"/>
-                                          </p:stCondLst>
-                                        </p:cTn>
-                                        <p:tgtEl>
-                                          <p:spTgt spid="6"/>
-                                        </p:tgtEl>
-                                        <p:attrNameLst>
-                                          <p:attrName>style.visibility</p:attrName>
-                                        </p:attrNameLst>
-                                      </p:cBhvr>
-                                      <p:to>
-                                        <p:strVal val="visible"/>
-                                      </p:to>
-                                    </p:set>
-                                    <p:anim calcmode="lin" valueType="num">
-                                      <p:cBhvr additive="base">
-                                        <p:cTn id="13" dur="500" fill="hold"/>
-                                        <p:tgtEl>
-                                          <p:spTgt spid="6"/>
-                                        </p:tgtEl>
-                                        <p:attrNameLst>
-                                          <p:attrName>ppt_x</p:attrName>
-                                        </p:attrNameLst>
-                                      </p:cBhvr>
-                                      <p:tavLst>
-                                        <p:tav tm="0">
-                                          <p:val>
-                                            <p:strVal val="#ppt_x"/>
-                                          </p:val>
-                                        </p:tav>
-                                        <p:tav tm="100000">
-                                          <p:val>
-                                            <p:strVal val="#ppt_x"/>
-                                          </p:val>
-                                        </p:tav>
-                                      </p:tavLst>
-                                    </p:anim>
-                                    <p:anim calcmode="lin" valueType="num">
-                                      <p:cBhvr additive="base">
-                                        <p:cTn id="14" dur="500" fill="hold"/>
-                                        <p:tgtEl>
-                                          <p:spTgt spid="6"/>
-                                        </p:tgtEl>
-                                        <p:attrNameLst>
-                                          <p:attrName>ppt_y</p:attrName>
-                                        </p:attrNameLst>
-                                      </p:cBhvr>
-                                      <p:tavLst>
-                                        <p:tav tm="0">
-                                          <p:val>
-                                            <p:strVal val="1+#ppt_h/2"/>
-                                          </p:val>
-                                        </p:tav>
-                                        <p:tav tm="100000">
-                                          <p:val>
-                                            <p:strVal val="#ppt_y"/>
-                                          </p:val>
-                                        </p:tav>
-                                      </p:tavLst>
-                                    </p:anim>
-                                  </p:childTnLst>
-                                </p:cTn>
-                              </p:par>
-                            </p:childTnLst>
-                          </p:cTn>
-                        </p:par>
-                      </p:childTnLst>
-                    </p:cTn>
-                  </p:par>
-                  <p:par>
-                    <p:cTn id="15" fill="hold">
-                      <p:stCondLst>
-                        <p:cond delay="indefinite"/>
-                      </p:stCondLst>
-                      <p:childTnLst>
-                        <p:par>
-                          <p:cTn id="16" fill="hold">
-                            <p:stCondLst>
-                              <p:cond delay="0"/>
-                            </p:stCondLst>
-                            <p:childTnLst>
-                              <p:par>
-                                <p:cTn id="17" presetID="2" presetClass="entr" presetSubtype="4" fill="hold" nodeType="clickEffect">
-                                  <p:stCondLst>
-                                    <p:cond delay="0"/>
-                                  </p:stCondLst>
-                                  <p:childTnLst>
-                                    <p:set>
-                                      <p:cBhvr>
-                                        <p:cTn id="18" dur="1" fill="hold">
-                                          <p:stCondLst>
-                                            <p:cond delay="0"/>
-                                          </p:stCondLst>
-                                        </p:cTn>
-                                        <p:tgtEl>
-                                          <p:spTgt spid="7"/>
-                                        </p:tgtEl>
-                                        <p:attrNameLst>
-                                          <p:attrName>style.visibility</p:attrName>
-                                        </p:attrNameLst>
-                                      </p:cBhvr>
-                                      <p:to>
-                                        <p:strVal val="visible"/>
-                                      </p:to>
-                                    </p:set>
-                                    <p:anim calcmode="lin" valueType="num">
-                                      <p:cBhvr additive="base">
-                                        <p:cTn id="19" dur="500" fill="hold"/>
-                                        <p:tgtEl>
-                                          <p:spTgt spid="7"/>
-                                        </p:tgtEl>
-                                        <p:attrNameLst>
-                                          <p:attrName>ppt_x</p:attrName>
-                                        </p:attrNameLst>
-                                      </p:cBhvr>
-                                      <p:tavLst>
-                                        <p:tav tm="0">
-                                          <p:val>
-                                            <p:strVal val="#ppt_x"/>
-                                          </p:val>
-                                        </p:tav>
-                                        <p:tav tm="100000">
-                                          <p:val>
-                                            <p:strVal val="#ppt_x"/>
-                                          </p:val>
-                                        </p:tav>
-                                      </p:tavLst>
-                                    </p:anim>
-                                    <p:anim calcmode="lin" valueType="num">
-                                      <p:cBhvr additive="base">
-                                        <p:cTn id="20" dur="500" fill="hold"/>
-                                        <p:tgtEl>
-                                          <p:spTgt spid="7"/>
-                                        </p:tgtEl>
-                                        <p:attrNameLst>
-                                          <p:attrName>ppt_y</p:attrName>
-                                        </p:attrNameLst>
-                                      </p:cBhvr>
-                                      <p:tavLst>
-                                        <p:tav tm="0">
-                                          <p:val>
-                                            <p:strVal val="1+#ppt_h/2"/>
-                                          </p:val>
-                                        </p:tav>
-                                        <p:tav tm="100000">
-                                          <p:val>
-                                            <p:strVal val="#ppt_y"/>
-                                          </p:val>
-                                        </p:tav>
-                                      </p:tavLst>
-                                    </p:anim>
-                                  </p:childTnLst>
-                                </p:cTn>
-                              </p:par>
-                            </p:childTnLst>
-                          </p:cTn>
-                        </p:par>
-                      </p:childTnLst>
-                    </p:cTn>
-                  </p:par>
-                  <p:par>
-                    <p:cTn id="21" fill="hold">
-                      <p:stCondLst>
-                        <p:cond delay="indefinite"/>
-                      </p:stCondLst>
-                      <p:childTnLst>
-                        <p:par>
-                          <p:cTn id="22" fill="hold">
-                            <p:stCondLst>
-                              <p:cond delay="0"/>
-                            </p:stCondLst>
-                            <p:childTnLst>
-                              <p:par>
-                                <p:cTn id="23" presetID="2" presetClass="entr" presetSubtype="4" fill="hold" nodeType="clickEffect">
-                                  <p:stCondLst>
-                                    <p:cond delay="0"/>
-                                  </p:stCondLst>
-                                  <p:childTnLst>
-                                    <p:set>
-                                      <p:cBhvr>
-                                        <p:cTn id="24" dur="1" fill="hold">
-                                          <p:stCondLst>
-                                            <p:cond delay="0"/>
-                                          </p:stCondLst>
-                                        </p:cTn>
-                                        <p:tgtEl>
-                                          <p:spTgt spid="8"/>
-                                        </p:tgtEl>
-                                        <p:attrNameLst>
-                                          <p:attrName>style.visibility</p:attrName>
-                                        </p:attrNameLst>
-                                      </p:cBhvr>
-                                      <p:to>
-                                        <p:strVal val="visible"/>
-                                      </p:to>
-                                    </p:set>
-                                    <p:anim calcmode="lin" valueType="num">
-                                      <p:cBhvr additive="base">
-                                        <p:cTn id="25" dur="500" fill="hold"/>
-                                        <p:tgtEl>
-                                          <p:spTgt spid="8"/>
-                                        </p:tgtEl>
-                                        <p:attrNameLst>
-                                          <p:attrName>ppt_x</p:attrName>
-                                        </p:attrNameLst>
-                                      </p:cBhvr>
-                                      <p:tavLst>
-                                        <p:tav tm="0">
-                                          <p:val>
-                                            <p:strVal val="#ppt_x"/>
-                                          </p:val>
-                                        </p:tav>
-                                        <p:tav tm="100000">
-                                          <p:val>
-                                            <p:strVal val="#ppt_x"/>
-                                          </p:val>
-                                        </p:tav>
-                                      </p:tavLst>
-                                    </p:anim>
-                                    <p:anim calcmode="lin" valueType="num">
-                                      <p:cBhvr additive="base">
-                                        <p:cTn id="26" dur="500" fill="hold"/>
-                                        <p:tgtEl>
-                                          <p:spTgt spid="8"/>
-                                        </p:tgtEl>
-                                        <p:attrNameLst>
-                                          <p:attrName>ppt_y</p:attrName>
-                                        </p:attrNameLst>
-                                      </p:cBhvr>
-                                      <p:tavLst>
-                                        <p:tav tm="0">
-                                          <p:val>
-                                            <p:strVal val="1+#ppt_h/2"/>
-                                          </p:val>
-                                        </p:tav>
-                                        <p:tav tm="100000">
-                                          <p:val>
-                                            <p:strVal val="#ppt_y"/>
-                                          </p:val>
-                                        </p:tav>
-                                      </p:tavLst>
-                                    </p:anim>
-                                  </p:childTnLst>
-                                </p:cTn>
-                              </p:par>
-                            </p:childTnLst>
-                          </p:cTn>
-                        </p:par>
-                      </p:childTnLst>
-                    </p:cTn>
-                  </p:par>
-                </p:childTnLst>
-              </p:cTn>
-              <p:prevCondLst>
-                <p:cond evt="onPrev" delay="0">
-                  <p:tgtEl>
-                    <p:sldTgt/>
-                  </p:tgtEl>
-                </p:cond>
-              </p:prevCondLst>
-              <p:nextCondLst>
-                <p:cond evt="onNext" delay="0">
-                  <p:tgtEl>
-                    <p:sldTgt/>
-                  </p:tgtEl>
-                </p:cond>
-              </p:nextCondLst>
-            </p:seq>
-          </p:childTnLst>
-        </p:cTn>
-      </p:par>
-    </p:tnLst>
-  </p:timing>
 </p:sld>
 </file>
 

</xml_diff>